<commit_message>
Updated presentations about regular expression
</commit_message>
<xml_diff>
--- a/week_4/Matcher and Pattern Class.pptx
+++ b/week_4/Matcher and Pattern Class.pptx
@@ -211,7 +211,7 @@
           <a:p>
             <a:fld id="{F666E1FD-E7A0-497B-BBC0-740BAAC97C64}" type="datetimeFigureOut">
               <a:rPr lang="en-PH" smtClean="0"/>
-              <a:t>05/01/2023</a:t>
+              <a:t>10/01/2023</a:t>
             </a:fld>
             <a:endParaRPr lang="en-PH"/>
           </a:p>
@@ -1216,7 +1216,7 @@
           <a:p>
             <a:fld id="{0CCF0B81-6BD8-4C65-9459-815598C5F1F4}" type="datetimeFigureOut">
               <a:rPr lang="en-PH" smtClean="0"/>
-              <a:t>05/01/2023</a:t>
+              <a:t>10/01/2023</a:t>
             </a:fld>
             <a:endParaRPr lang="en-PH"/>
           </a:p>
@@ -1416,7 +1416,7 @@
           <a:p>
             <a:fld id="{0CCF0B81-6BD8-4C65-9459-815598C5F1F4}" type="datetimeFigureOut">
               <a:rPr lang="en-PH" smtClean="0"/>
-              <a:t>05/01/2023</a:t>
+              <a:t>10/01/2023</a:t>
             </a:fld>
             <a:endParaRPr lang="en-PH"/>
           </a:p>
@@ -1626,7 +1626,7 @@
           <a:p>
             <a:fld id="{0CCF0B81-6BD8-4C65-9459-815598C5F1F4}" type="datetimeFigureOut">
               <a:rPr lang="en-PH" smtClean="0"/>
-              <a:t>05/01/2023</a:t>
+              <a:t>10/01/2023</a:t>
             </a:fld>
             <a:endParaRPr lang="en-PH"/>
           </a:p>
@@ -1826,7 +1826,7 @@
           <a:p>
             <a:fld id="{0CCF0B81-6BD8-4C65-9459-815598C5F1F4}" type="datetimeFigureOut">
               <a:rPr lang="en-PH" smtClean="0"/>
-              <a:t>05/01/2023</a:t>
+              <a:t>10/01/2023</a:t>
             </a:fld>
             <a:endParaRPr lang="en-PH"/>
           </a:p>
@@ -2102,7 +2102,7 @@
           <a:p>
             <a:fld id="{0CCF0B81-6BD8-4C65-9459-815598C5F1F4}" type="datetimeFigureOut">
               <a:rPr lang="en-PH" smtClean="0"/>
-              <a:t>05/01/2023</a:t>
+              <a:t>10/01/2023</a:t>
             </a:fld>
             <a:endParaRPr lang="en-PH"/>
           </a:p>
@@ -2370,7 +2370,7 @@
           <a:p>
             <a:fld id="{0CCF0B81-6BD8-4C65-9459-815598C5F1F4}" type="datetimeFigureOut">
               <a:rPr lang="en-PH" smtClean="0"/>
-              <a:t>05/01/2023</a:t>
+              <a:t>10/01/2023</a:t>
             </a:fld>
             <a:endParaRPr lang="en-PH"/>
           </a:p>
@@ -2785,7 +2785,7 @@
           <a:p>
             <a:fld id="{0CCF0B81-6BD8-4C65-9459-815598C5F1F4}" type="datetimeFigureOut">
               <a:rPr lang="en-PH" smtClean="0"/>
-              <a:t>05/01/2023</a:t>
+              <a:t>10/01/2023</a:t>
             </a:fld>
             <a:endParaRPr lang="en-PH"/>
           </a:p>
@@ -2927,7 +2927,7 @@
           <a:p>
             <a:fld id="{0CCF0B81-6BD8-4C65-9459-815598C5F1F4}" type="datetimeFigureOut">
               <a:rPr lang="en-PH" smtClean="0"/>
-              <a:t>05/01/2023</a:t>
+              <a:t>10/01/2023</a:t>
             </a:fld>
             <a:endParaRPr lang="en-PH"/>
           </a:p>
@@ -3040,7 +3040,7 @@
           <a:p>
             <a:fld id="{0CCF0B81-6BD8-4C65-9459-815598C5F1F4}" type="datetimeFigureOut">
               <a:rPr lang="en-PH" smtClean="0"/>
-              <a:t>05/01/2023</a:t>
+              <a:t>10/01/2023</a:t>
             </a:fld>
             <a:endParaRPr lang="en-PH"/>
           </a:p>
@@ -3353,7 +3353,7 @@
           <a:p>
             <a:fld id="{0CCF0B81-6BD8-4C65-9459-815598C5F1F4}" type="datetimeFigureOut">
               <a:rPr lang="en-PH" smtClean="0"/>
-              <a:t>05/01/2023</a:t>
+              <a:t>10/01/2023</a:t>
             </a:fld>
             <a:endParaRPr lang="en-PH"/>
           </a:p>
@@ -3642,7 +3642,7 @@
           <a:p>
             <a:fld id="{0CCF0B81-6BD8-4C65-9459-815598C5F1F4}" type="datetimeFigureOut">
               <a:rPr lang="en-PH" smtClean="0"/>
-              <a:t>05/01/2023</a:t>
+              <a:t>10/01/2023</a:t>
             </a:fld>
             <a:endParaRPr lang="en-PH"/>
           </a:p>
@@ -3885,7 +3885,7 @@
           <a:p>
             <a:fld id="{0CCF0B81-6BD8-4C65-9459-815598C5F1F4}" type="datetimeFigureOut">
               <a:rPr lang="en-PH" smtClean="0"/>
-              <a:t>05/01/2023</a:t>
+              <a:t>10/01/2023</a:t>
             </a:fld>
             <a:endParaRPr lang="en-PH"/>
           </a:p>
@@ -5626,7 +5626,7 @@
               <a:rPr lang="en-PH" sz="2500" dirty="0" err="1">
                 <a:latin typeface="Consolas" panose="020B0609020204030204" pitchFamily="49" charset="0"/>
               </a:rPr>
-              <a:t>java.io.regex</a:t>
+              <a:t>java.util.regex</a:t>
             </a:r>
             <a:r>
               <a:rPr lang="en-PH" sz="2500" dirty="0" err="1">

</xml_diff>